<commit_message>
small ppt update wk5
</commit_message>
<xml_diff>
--- a/Week05/HtmlCssReviewActivity.pptx
+++ b/Week05/HtmlCssReviewActivity.pptx
@@ -4124,7 +4124,7 @@
           <a:p>
             <a:fld id="{5958763E-B898-436D-883D-03711491D54A}" type="datetimeFigureOut">
               <a:rPr lang="en-US" smtClean="0"/>
-              <a:t>4/9/2025</a:t>
+              <a:t>2/5/2026</a:t>
             </a:fld>
             <a:endParaRPr lang="en-US"/>
           </a:p>
@@ -4439,7 +4439,7 @@
             <a:fld id="{1C2D31DE-C454-491C-B5C3-F097855E3DF7}" type="datetime4">
               <a:rPr lang="en-US" smtClean="0"/>
               <a:pPr/>
-              <a:t>April 9, 2025</a:t>
+              <a:t>February 5, 2026</a:t>
             </a:fld>
             <a:endParaRPr lang="en-US" dirty="0"/>
           </a:p>
@@ -8883,45 +8883,17 @@
               <a:buNone/>
             </a:pPr>
             <a:r>
-              <a:rPr lang="en-US" dirty="0">
-                <a:hlinkClick r:id="rId2"/>
-              </a:rPr>
-              <a:t>https://replit.com/join/</a:t>
+              <a:rPr lang="en-US" sz="3200" dirty="0"/>
+              <a:t>Person A</a:t>
             </a:r>
-            <a:endParaRPr lang="en-US" dirty="0"/>
           </a:p>
           <a:p>
             <a:pPr marL="127000" indent="0">
-              <a:buNone/>
-            </a:pPr>
-            <a:r>
-              <a:rPr lang="en-US" sz="2400" b="1" u="sng" dirty="0" err="1"/>
-              <a:t>iwrphdxtqh-hylandoutreach</a:t>
-            </a:r>
-            <a:endParaRPr lang="en-US" sz="2400" b="1" u="sng" dirty="0"/>
-          </a:p>
-          <a:p>
-            <a:pPr marL="127000" indent="0" algn="ctr">
-              <a:buNone/>
-            </a:pPr>
-            <a:endParaRPr lang="en-US" sz="3200" dirty="0"/>
-          </a:p>
-          <a:p>
-            <a:pPr marL="127000" indent="0" algn="ctr">
               <a:buNone/>
             </a:pPr>
             <a:r>
               <a:rPr lang="en-US" sz="3200" dirty="0"/>
-              <a:t>In-Person</a:t>
-            </a:r>
-          </a:p>
-          <a:p>
-            <a:pPr marL="127000" indent="0" algn="ctr">
-              <a:buNone/>
-            </a:pPr>
-            <a:r>
-              <a:rPr lang="en-US" sz="3200" dirty="0"/>
-              <a:t>House Left</a:t>
+              <a:t>Person B</a:t>
             </a:r>
           </a:p>
         </p:txBody>
@@ -8970,45 +8942,106 @@
               <a:buNone/>
             </a:pPr>
             <a:endParaRPr lang="en-US" sz="2100" dirty="0">
-              <a:hlinkClick r:id="rId3"/>
+              <a:hlinkClick r:id="rId2"/>
             </a:endParaRPr>
           </a:p>
           <a:p>
-            <a:pPr marL="127000" indent="0">
-              <a:buNone/>
+            <a:pPr marL="127000" marR="0" lvl="0" indent="0" algn="l" defTabSz="914400" rtl="0" eaLnBrk="1" fontAlgn="auto" latinLnBrk="0" hangingPunct="1">
+              <a:lnSpc>
+                <a:spcPct val="100000"/>
+              </a:lnSpc>
+              <a:spcBef>
+                <a:spcPts val="0"/>
+              </a:spcBef>
+              <a:spcAft>
+                <a:spcPts val="0"/>
+              </a:spcAft>
+              <a:buClr>
+                <a:srgbClr val="000000"/>
+              </a:buClr>
+              <a:buSzPts val="1600"/>
+              <a:buFont typeface="Miriam Libre"/>
+              <a:buNone/>
+              <a:tabLst/>
+              <a:defRPr/>
             </a:pPr>
             <a:r>
-              <a:rPr lang="en-US" dirty="0">
-                <a:hlinkClick r:id="rId2"/>
+              <a:rPr kumimoji="0" lang="en-US" sz="3200" b="0" i="0" u="none" strike="noStrike" kern="0" cap="none" spc="0" normalizeH="0" baseline="0" noProof="0" dirty="0">
+                <a:ln>
+                  <a:noFill/>
+                </a:ln>
+                <a:solidFill>
+                  <a:srgbClr val="000000"/>
+                </a:solidFill>
+                <a:effectLst/>
+                <a:uLnTx/>
+                <a:uFillTx/>
+                <a:latin typeface="Miriam Libre"/>
+                <a:cs typeface="Miriam Libre"/>
+                <a:sym typeface="Miriam Libre"/>
               </a:rPr>
-              <a:t>https://replit.com/join/</a:t>
+              <a:t>Person E</a:t>
             </a:r>
-            <a:endParaRPr lang="en-US" dirty="0"/>
-          </a:p>
-          <a:p>
-            <a:pPr marL="127000" indent="0">
-              <a:buNone/>
+          </a:p>
+          <a:p>
+            <a:pPr marL="127000" marR="0" lvl="0" indent="0" algn="l" defTabSz="914400" rtl="0" eaLnBrk="1" fontAlgn="auto" latinLnBrk="0" hangingPunct="1">
+              <a:lnSpc>
+                <a:spcPct val="100000"/>
+              </a:lnSpc>
+              <a:spcBef>
+                <a:spcPts val="0"/>
+              </a:spcBef>
+              <a:spcAft>
+                <a:spcPts val="0"/>
+              </a:spcAft>
+              <a:buClr>
+                <a:srgbClr val="000000"/>
+              </a:buClr>
+              <a:buSzPts val="1600"/>
+              <a:buFont typeface="Miriam Libre"/>
+              <a:buNone/>
+              <a:tabLst/>
+              <a:defRPr/>
             </a:pPr>
             <a:r>
-              <a:rPr lang="en-US" sz="2400" b="1" u="sng" dirty="0" err="1"/>
-              <a:t>ntdyhoognx-hylandoutreach</a:t>
+              <a:rPr kumimoji="0" lang="en-US" sz="3200" b="0" i="0" u="none" strike="noStrike" kern="0" cap="none" spc="0" normalizeH="0" baseline="0" noProof="0">
+                <a:ln>
+                  <a:noFill/>
+                </a:ln>
+                <a:solidFill>
+                  <a:srgbClr val="000000"/>
+                </a:solidFill>
+                <a:effectLst/>
+                <a:uLnTx/>
+                <a:uFillTx/>
+                <a:latin typeface="Miriam Libre"/>
+                <a:cs typeface="Miriam Libre"/>
+                <a:sym typeface="Miriam Libre"/>
+              </a:rPr>
+              <a:t>Person F</a:t>
             </a:r>
-            <a:endParaRPr lang="en-US" sz="2400" b="1" u="sng" dirty="0"/>
-          </a:p>
-          <a:p>
-            <a:pPr marL="127000" indent="0" algn="ctr">
+            <a:endParaRPr kumimoji="0" lang="en-US" sz="3200" b="0" i="0" u="none" strike="noStrike" kern="0" cap="none" spc="0" normalizeH="0" baseline="0" noProof="0" dirty="0">
+              <a:ln>
+                <a:noFill/>
+              </a:ln>
+              <a:solidFill>
+                <a:srgbClr val="000000"/>
+              </a:solidFill>
+              <a:effectLst/>
+              <a:uLnTx/>
+              <a:uFillTx/>
+              <a:latin typeface="Miriam Libre"/>
+              <a:cs typeface="Miriam Libre"/>
+              <a:sym typeface="Miriam Libre"/>
+            </a:endParaRPr>
+          </a:p>
+          <a:p>
+            <a:pPr marL="42863" indent="0" algn="ctr">
               <a:buNone/>
             </a:pPr>
-            <a:endParaRPr lang="en-US" sz="3200" dirty="0"/>
-          </a:p>
-          <a:p>
-            <a:pPr marL="127000" indent="0" algn="ctr">
-              <a:buNone/>
-            </a:pPr>
-            <a:r>
-              <a:rPr lang="en-US" sz="3200" dirty="0"/>
-              <a:t>Virtual</a:t>
-            </a:r>
+            <a:endParaRPr lang="en-US" sz="2100" dirty="0">
+              <a:hlinkClick r:id="rId2"/>
+            </a:endParaRPr>
           </a:p>
         </p:txBody>
       </p:sp>
@@ -9052,61 +9085,91 @@
             </a:r>
           </a:p>
           <a:p>
-            <a:pPr marL="42863" indent="0" algn="ctr">
+            <a:pPr marL="127000" indent="0">
               <a:buNone/>
             </a:pPr>
-            <a:endParaRPr lang="en-US" b="1" u="sng" dirty="0"/>
-          </a:p>
-          <a:p>
-            <a:pPr marL="127000" indent="0">
-              <a:buNone/>
+            <a:endParaRPr lang="en-US" dirty="0"/>
+          </a:p>
+          <a:p>
+            <a:pPr marL="127000" marR="0" lvl="0" indent="0" algn="l" defTabSz="914400" rtl="0" eaLnBrk="1" fontAlgn="auto" latinLnBrk="0" hangingPunct="1">
+              <a:lnSpc>
+                <a:spcPct val="100000"/>
+              </a:lnSpc>
+              <a:spcBef>
+                <a:spcPts val="0"/>
+              </a:spcBef>
+              <a:spcAft>
+                <a:spcPts val="0"/>
+              </a:spcAft>
+              <a:buClr>
+                <a:srgbClr val="000000"/>
+              </a:buClr>
+              <a:buSzPts val="1600"/>
+              <a:buFont typeface="Miriam Libre"/>
+              <a:buNone/>
+              <a:tabLst/>
+              <a:defRPr/>
             </a:pPr>
             <a:r>
-              <a:rPr lang="en-US" dirty="0">
-                <a:hlinkClick r:id="rId2"/>
+              <a:rPr kumimoji="0" lang="en-US" sz="3200" b="0" i="0" u="none" strike="noStrike" kern="0" cap="none" spc="0" normalizeH="0" baseline="0" noProof="0" dirty="0">
+                <a:ln>
+                  <a:noFill/>
+                </a:ln>
+                <a:solidFill>
+                  <a:srgbClr val="000000"/>
+                </a:solidFill>
+                <a:effectLst/>
+                <a:uLnTx/>
+                <a:uFillTx/>
+                <a:latin typeface="Miriam Libre"/>
+                <a:cs typeface="Miriam Libre"/>
+                <a:sym typeface="Miriam Libre"/>
               </a:rPr>
-              <a:t>https://replit.com/join/</a:t>
+              <a:t>Person C</a:t>
             </a:r>
-            <a:endParaRPr lang="en-US" dirty="0"/>
-          </a:p>
-          <a:p>
-            <a:pPr marL="127000" indent="0">
-              <a:buNone/>
+          </a:p>
+          <a:p>
+            <a:pPr marL="127000" marR="0" lvl="0" indent="0" algn="l" defTabSz="914400" rtl="0" eaLnBrk="1" fontAlgn="auto" latinLnBrk="0" hangingPunct="1">
+              <a:lnSpc>
+                <a:spcPct val="100000"/>
+              </a:lnSpc>
+              <a:spcBef>
+                <a:spcPts val="0"/>
+              </a:spcBef>
+              <a:spcAft>
+                <a:spcPts val="0"/>
+              </a:spcAft>
+              <a:buClr>
+                <a:srgbClr val="000000"/>
+              </a:buClr>
+              <a:buSzPts val="1600"/>
+              <a:buFont typeface="Miriam Libre"/>
+              <a:buNone/>
+              <a:tabLst/>
+              <a:defRPr/>
             </a:pPr>
             <a:r>
-              <a:rPr lang="en-US" sz="2400" b="1" u="sng" dirty="0" err="1"/>
-              <a:t>lncqcuvvdw-hylandoutreach</a:t>
+              <a:rPr kumimoji="0" lang="en-US" sz="3200" b="0" i="0" u="none" strike="noStrike" kern="0" cap="none" spc="0" normalizeH="0" baseline="0" noProof="0" dirty="0">
+                <a:ln>
+                  <a:noFill/>
+                </a:ln>
+                <a:solidFill>
+                  <a:srgbClr val="000000"/>
+                </a:solidFill>
+                <a:effectLst/>
+                <a:uLnTx/>
+                <a:uFillTx/>
+                <a:latin typeface="Miriam Libre"/>
+                <a:cs typeface="Miriam Libre"/>
+                <a:sym typeface="Miriam Libre"/>
+              </a:rPr>
+              <a:t>Person D</a:t>
             </a:r>
-            <a:endParaRPr lang="en-US" sz="2400" b="1" u="sng" dirty="0"/>
-          </a:p>
-          <a:p>
-            <a:pPr marL="127000" indent="0" algn="ctr">
+          </a:p>
+          <a:p>
+            <a:pPr marL="127000" indent="0">
               <a:buNone/>
             </a:pPr>
-            <a:endParaRPr lang="en-US" sz="3200" dirty="0"/>
-          </a:p>
-          <a:p>
-            <a:pPr marL="127000" indent="0" algn="ctr">
-              <a:buNone/>
-            </a:pPr>
-            <a:r>
-              <a:rPr lang="en-US" sz="3200" dirty="0"/>
-              <a:t>In-Person</a:t>
-            </a:r>
-          </a:p>
-          <a:p>
-            <a:pPr marL="127000" indent="0" algn="ctr">
-              <a:buNone/>
-            </a:pPr>
-            <a:r>
-              <a:rPr lang="en-US" sz="3200" dirty="0"/>
-              <a:t>House Right</a:t>
-            </a:r>
-          </a:p>
-          <a:p>
-            <a:endParaRPr lang="en-US" dirty="0"/>
-          </a:p>
-          <a:p>
             <a:endParaRPr lang="en-US" dirty="0"/>
           </a:p>
         </p:txBody>

</xml_diff>

<commit_message>
Update gitbook 2026-02-05 18:11:29
</commit_message>
<xml_diff>
--- a/Week05/HtmlCssReviewActivity.pptx
+++ b/Week05/HtmlCssReviewActivity.pptx
@@ -4124,7 +4124,7 @@
           <a:p>
             <a:fld id="{5958763E-B898-436D-883D-03711491D54A}" type="datetimeFigureOut">
               <a:rPr lang="en-US" smtClean="0"/>
-              <a:t>4/9/2025</a:t>
+              <a:t>2/5/2026</a:t>
             </a:fld>
             <a:endParaRPr lang="en-US"/>
           </a:p>
@@ -4439,7 +4439,7 @@
             <a:fld id="{1C2D31DE-C454-491C-B5C3-F097855E3DF7}" type="datetime4">
               <a:rPr lang="en-US" smtClean="0"/>
               <a:pPr/>
-              <a:t>April 9, 2025</a:t>
+              <a:t>February 5, 2026</a:t>
             </a:fld>
             <a:endParaRPr lang="en-US" dirty="0"/>
           </a:p>
@@ -8883,45 +8883,17 @@
               <a:buNone/>
             </a:pPr>
             <a:r>
-              <a:rPr lang="en-US" dirty="0">
-                <a:hlinkClick r:id="rId2"/>
-              </a:rPr>
-              <a:t>https://replit.com/join/</a:t>
+              <a:rPr lang="en-US" sz="3200" dirty="0"/>
+              <a:t>Person A</a:t>
             </a:r>
-            <a:endParaRPr lang="en-US" dirty="0"/>
           </a:p>
           <a:p>
             <a:pPr marL="127000" indent="0">
-              <a:buNone/>
-            </a:pPr>
-            <a:r>
-              <a:rPr lang="en-US" sz="2400" b="1" u="sng" dirty="0" err="1"/>
-              <a:t>iwrphdxtqh-hylandoutreach</a:t>
-            </a:r>
-            <a:endParaRPr lang="en-US" sz="2400" b="1" u="sng" dirty="0"/>
-          </a:p>
-          <a:p>
-            <a:pPr marL="127000" indent="0" algn="ctr">
-              <a:buNone/>
-            </a:pPr>
-            <a:endParaRPr lang="en-US" sz="3200" dirty="0"/>
-          </a:p>
-          <a:p>
-            <a:pPr marL="127000" indent="0" algn="ctr">
               <a:buNone/>
             </a:pPr>
             <a:r>
               <a:rPr lang="en-US" sz="3200" dirty="0"/>
-              <a:t>In-Person</a:t>
-            </a:r>
-          </a:p>
-          <a:p>
-            <a:pPr marL="127000" indent="0" algn="ctr">
-              <a:buNone/>
-            </a:pPr>
-            <a:r>
-              <a:rPr lang="en-US" sz="3200" dirty="0"/>
-              <a:t>House Left</a:t>
+              <a:t>Person B</a:t>
             </a:r>
           </a:p>
         </p:txBody>
@@ -8970,45 +8942,106 @@
               <a:buNone/>
             </a:pPr>
             <a:endParaRPr lang="en-US" sz="2100" dirty="0">
-              <a:hlinkClick r:id="rId3"/>
+              <a:hlinkClick r:id="rId2"/>
             </a:endParaRPr>
           </a:p>
           <a:p>
-            <a:pPr marL="127000" indent="0">
-              <a:buNone/>
+            <a:pPr marL="127000" marR="0" lvl="0" indent="0" algn="l" defTabSz="914400" rtl="0" eaLnBrk="1" fontAlgn="auto" latinLnBrk="0" hangingPunct="1">
+              <a:lnSpc>
+                <a:spcPct val="100000"/>
+              </a:lnSpc>
+              <a:spcBef>
+                <a:spcPts val="0"/>
+              </a:spcBef>
+              <a:spcAft>
+                <a:spcPts val="0"/>
+              </a:spcAft>
+              <a:buClr>
+                <a:srgbClr val="000000"/>
+              </a:buClr>
+              <a:buSzPts val="1600"/>
+              <a:buFont typeface="Miriam Libre"/>
+              <a:buNone/>
+              <a:tabLst/>
+              <a:defRPr/>
             </a:pPr>
             <a:r>
-              <a:rPr lang="en-US" dirty="0">
-                <a:hlinkClick r:id="rId2"/>
+              <a:rPr kumimoji="0" lang="en-US" sz="3200" b="0" i="0" u="none" strike="noStrike" kern="0" cap="none" spc="0" normalizeH="0" baseline="0" noProof="0" dirty="0">
+                <a:ln>
+                  <a:noFill/>
+                </a:ln>
+                <a:solidFill>
+                  <a:srgbClr val="000000"/>
+                </a:solidFill>
+                <a:effectLst/>
+                <a:uLnTx/>
+                <a:uFillTx/>
+                <a:latin typeface="Miriam Libre"/>
+                <a:cs typeface="Miriam Libre"/>
+                <a:sym typeface="Miriam Libre"/>
               </a:rPr>
-              <a:t>https://replit.com/join/</a:t>
+              <a:t>Person E</a:t>
             </a:r>
-            <a:endParaRPr lang="en-US" dirty="0"/>
-          </a:p>
-          <a:p>
-            <a:pPr marL="127000" indent="0">
-              <a:buNone/>
+          </a:p>
+          <a:p>
+            <a:pPr marL="127000" marR="0" lvl="0" indent="0" algn="l" defTabSz="914400" rtl="0" eaLnBrk="1" fontAlgn="auto" latinLnBrk="0" hangingPunct="1">
+              <a:lnSpc>
+                <a:spcPct val="100000"/>
+              </a:lnSpc>
+              <a:spcBef>
+                <a:spcPts val="0"/>
+              </a:spcBef>
+              <a:spcAft>
+                <a:spcPts val="0"/>
+              </a:spcAft>
+              <a:buClr>
+                <a:srgbClr val="000000"/>
+              </a:buClr>
+              <a:buSzPts val="1600"/>
+              <a:buFont typeface="Miriam Libre"/>
+              <a:buNone/>
+              <a:tabLst/>
+              <a:defRPr/>
             </a:pPr>
             <a:r>
-              <a:rPr lang="en-US" sz="2400" b="1" u="sng" dirty="0" err="1"/>
-              <a:t>ntdyhoognx-hylandoutreach</a:t>
+              <a:rPr kumimoji="0" lang="en-US" sz="3200" b="0" i="0" u="none" strike="noStrike" kern="0" cap="none" spc="0" normalizeH="0" baseline="0" noProof="0">
+                <a:ln>
+                  <a:noFill/>
+                </a:ln>
+                <a:solidFill>
+                  <a:srgbClr val="000000"/>
+                </a:solidFill>
+                <a:effectLst/>
+                <a:uLnTx/>
+                <a:uFillTx/>
+                <a:latin typeface="Miriam Libre"/>
+                <a:cs typeface="Miriam Libre"/>
+                <a:sym typeface="Miriam Libre"/>
+              </a:rPr>
+              <a:t>Person F</a:t>
             </a:r>
-            <a:endParaRPr lang="en-US" sz="2400" b="1" u="sng" dirty="0"/>
-          </a:p>
-          <a:p>
-            <a:pPr marL="127000" indent="0" algn="ctr">
+            <a:endParaRPr kumimoji="0" lang="en-US" sz="3200" b="0" i="0" u="none" strike="noStrike" kern="0" cap="none" spc="0" normalizeH="0" baseline="0" noProof="0" dirty="0">
+              <a:ln>
+                <a:noFill/>
+              </a:ln>
+              <a:solidFill>
+                <a:srgbClr val="000000"/>
+              </a:solidFill>
+              <a:effectLst/>
+              <a:uLnTx/>
+              <a:uFillTx/>
+              <a:latin typeface="Miriam Libre"/>
+              <a:cs typeface="Miriam Libre"/>
+              <a:sym typeface="Miriam Libre"/>
+            </a:endParaRPr>
+          </a:p>
+          <a:p>
+            <a:pPr marL="42863" indent="0" algn="ctr">
               <a:buNone/>
             </a:pPr>
-            <a:endParaRPr lang="en-US" sz="3200" dirty="0"/>
-          </a:p>
-          <a:p>
-            <a:pPr marL="127000" indent="0" algn="ctr">
-              <a:buNone/>
-            </a:pPr>
-            <a:r>
-              <a:rPr lang="en-US" sz="3200" dirty="0"/>
-              <a:t>Virtual</a:t>
-            </a:r>
+            <a:endParaRPr lang="en-US" sz="2100" dirty="0">
+              <a:hlinkClick r:id="rId2"/>
+            </a:endParaRPr>
           </a:p>
         </p:txBody>
       </p:sp>
@@ -9052,61 +9085,91 @@
             </a:r>
           </a:p>
           <a:p>
-            <a:pPr marL="42863" indent="0" algn="ctr">
+            <a:pPr marL="127000" indent="0">
               <a:buNone/>
             </a:pPr>
-            <a:endParaRPr lang="en-US" b="1" u="sng" dirty="0"/>
-          </a:p>
-          <a:p>
-            <a:pPr marL="127000" indent="0">
-              <a:buNone/>
+            <a:endParaRPr lang="en-US" dirty="0"/>
+          </a:p>
+          <a:p>
+            <a:pPr marL="127000" marR="0" lvl="0" indent="0" algn="l" defTabSz="914400" rtl="0" eaLnBrk="1" fontAlgn="auto" latinLnBrk="0" hangingPunct="1">
+              <a:lnSpc>
+                <a:spcPct val="100000"/>
+              </a:lnSpc>
+              <a:spcBef>
+                <a:spcPts val="0"/>
+              </a:spcBef>
+              <a:spcAft>
+                <a:spcPts val="0"/>
+              </a:spcAft>
+              <a:buClr>
+                <a:srgbClr val="000000"/>
+              </a:buClr>
+              <a:buSzPts val="1600"/>
+              <a:buFont typeface="Miriam Libre"/>
+              <a:buNone/>
+              <a:tabLst/>
+              <a:defRPr/>
             </a:pPr>
             <a:r>
-              <a:rPr lang="en-US" dirty="0">
-                <a:hlinkClick r:id="rId2"/>
+              <a:rPr kumimoji="0" lang="en-US" sz="3200" b="0" i="0" u="none" strike="noStrike" kern="0" cap="none" spc="0" normalizeH="0" baseline="0" noProof="0" dirty="0">
+                <a:ln>
+                  <a:noFill/>
+                </a:ln>
+                <a:solidFill>
+                  <a:srgbClr val="000000"/>
+                </a:solidFill>
+                <a:effectLst/>
+                <a:uLnTx/>
+                <a:uFillTx/>
+                <a:latin typeface="Miriam Libre"/>
+                <a:cs typeface="Miriam Libre"/>
+                <a:sym typeface="Miriam Libre"/>
               </a:rPr>
-              <a:t>https://replit.com/join/</a:t>
+              <a:t>Person C</a:t>
             </a:r>
-            <a:endParaRPr lang="en-US" dirty="0"/>
-          </a:p>
-          <a:p>
-            <a:pPr marL="127000" indent="0">
-              <a:buNone/>
+          </a:p>
+          <a:p>
+            <a:pPr marL="127000" marR="0" lvl="0" indent="0" algn="l" defTabSz="914400" rtl="0" eaLnBrk="1" fontAlgn="auto" latinLnBrk="0" hangingPunct="1">
+              <a:lnSpc>
+                <a:spcPct val="100000"/>
+              </a:lnSpc>
+              <a:spcBef>
+                <a:spcPts val="0"/>
+              </a:spcBef>
+              <a:spcAft>
+                <a:spcPts val="0"/>
+              </a:spcAft>
+              <a:buClr>
+                <a:srgbClr val="000000"/>
+              </a:buClr>
+              <a:buSzPts val="1600"/>
+              <a:buFont typeface="Miriam Libre"/>
+              <a:buNone/>
+              <a:tabLst/>
+              <a:defRPr/>
             </a:pPr>
             <a:r>
-              <a:rPr lang="en-US" sz="2400" b="1" u="sng" dirty="0" err="1"/>
-              <a:t>lncqcuvvdw-hylandoutreach</a:t>
+              <a:rPr kumimoji="0" lang="en-US" sz="3200" b="0" i="0" u="none" strike="noStrike" kern="0" cap="none" spc="0" normalizeH="0" baseline="0" noProof="0" dirty="0">
+                <a:ln>
+                  <a:noFill/>
+                </a:ln>
+                <a:solidFill>
+                  <a:srgbClr val="000000"/>
+                </a:solidFill>
+                <a:effectLst/>
+                <a:uLnTx/>
+                <a:uFillTx/>
+                <a:latin typeface="Miriam Libre"/>
+                <a:cs typeface="Miriam Libre"/>
+                <a:sym typeface="Miriam Libre"/>
+              </a:rPr>
+              <a:t>Person D</a:t>
             </a:r>
-            <a:endParaRPr lang="en-US" sz="2400" b="1" u="sng" dirty="0"/>
-          </a:p>
-          <a:p>
-            <a:pPr marL="127000" indent="0" algn="ctr">
+          </a:p>
+          <a:p>
+            <a:pPr marL="127000" indent="0">
               <a:buNone/>
             </a:pPr>
-            <a:endParaRPr lang="en-US" sz="3200" dirty="0"/>
-          </a:p>
-          <a:p>
-            <a:pPr marL="127000" indent="0" algn="ctr">
-              <a:buNone/>
-            </a:pPr>
-            <a:r>
-              <a:rPr lang="en-US" sz="3200" dirty="0"/>
-              <a:t>In-Person</a:t>
-            </a:r>
-          </a:p>
-          <a:p>
-            <a:pPr marL="127000" indent="0" algn="ctr">
-              <a:buNone/>
-            </a:pPr>
-            <a:r>
-              <a:rPr lang="en-US" sz="3200" dirty="0"/>
-              <a:t>House Right</a:t>
-            </a:r>
-          </a:p>
-          <a:p>
-            <a:endParaRPr lang="en-US" dirty="0"/>
-          </a:p>
-          <a:p>
             <a:endParaRPr lang="en-US" dirty="0"/>
           </a:p>
         </p:txBody>

</xml_diff>